<commit_message>
Creacion de Grafico en linea funcional con ingreso de parametros
</commit_message>
<xml_diff>
--- a/app/Http/Controllers/sample.pptx
+++ b/app/Http/Controllers/sample.pptx
@@ -6,6 +6,7 @@
   </p:sldMasterIdLst>
   <p:sldIdLst>
     <p:sldId id="256" r:id="rId3"/>
+    <p:sldId id="257" r:id="rId4"/>
   </p:sldIdLst>
   <p:sldSz cx="9144000" cy="6858000" type="screen4x3"/>
   <p:notesSz cx="6858000" cy="9144000"/>
@@ -105,6 +106,327 @@
     </a:lvl9pPr>
   </p:defaultTextStyle>
 </p:presentation>
+</file>
+
+<file path=ppt/charts/chart1.xml><?xml version="1.0" encoding="utf-8"?>
+<c:chartSpace xmlns:c="http://schemas.openxmlformats.org/drawingml/2006/chart" xmlns:a="http://schemas.openxmlformats.org/drawingml/2006/main" xmlns:r="http://schemas.openxmlformats.org/officeDocument/2006/relationships">
+  <c:date1904 val="1"/>
+  <c:lang val="en-US"/>
+  <c:chart>
+    <c:title>
+      <c:tx>
+        <c:rich>
+          <a:bodyPr/>
+          <a:lstStyle/>
+          <a:p>
+            <a:pPr algn="l" fontAlgn="base" marL="0" marR="0" indent="0" lvl="0">
+              <a:defRPr/>
+            </a:pPr>
+            <a:r>
+              <a:rPr lang="en-US" dirty="0" b="false" i="true" strike="noStrike" sz="1800" u="none">
+                <a:solidFill>
+                  <a:srgbClr val="000000">
+                    <a:alpha val="100.00%"/>
+                  </a:srgbClr>
+                </a:solidFill>
+                <a:latin typeface="Calibri"/>
+              </a:rPr>
+              <a:t>PHPPRESENTATION PRUEBA DE GRAFICO</a:t>
+            </a:r>
+            <a:endParaRPr lang="en-US" dirty="0"/>
+          </a:p>
+        </c:rich>
+      </c:tx>
+      <c:layout>
+        <c:manualLayout>
+          <c:xMode val="edge"/>
+          <c:yMode val="edge"/>
+          <c:x val="0.01"/>
+          <c:y val="0.01"/>
+        </c:manualLayout>
+      </c:layout>
+      <c:overlay val="0"/>
+    </c:title>
+    <c:autoTitleDeleted val="0"/>
+    <c:view3D>
+      <c:rotX val="30"/>
+      <c:hPercent val="100"/>
+      <c:rotY val="0"/>
+      <c:depthPercent val="100"/>
+      <c:rAngAx val="1"/>
+      <c:perspective val="30"/>
+    </c:view3D>
+    <c:plotArea>
+      <c:layout>
+        <c:manualLayout>
+          <c:xMode val="edge"/>
+          <c:yMode val="edge"/>
+        </c:manualLayout>
+      </c:layout>
+      <c:lineChart>
+        <c:grouping val="standard"/>
+        <c:ser>
+          <c:idx val="0"/>
+          <c:order val="0"/>
+          <c:tx>
+            <c:v>Views</c:v>
+          </c:tx>
+          <c:spPr>
+            <a:noFill/>
+            <a:ln w="12700">
+              <a:solidFill>
+                <a:srgbClr val="000000">
+                  <a:alpha val="100.00%"/>
+                </a:srgbClr>
+              </a:solidFill>
+            </a:ln>
+          </c:spPr>
+          <c:marker>
+            <c:symbol val="none"/>
+          </c:marker>
+          <c:dLbls>
+            <c:txPr>
+              <a:bodyPr/>
+              <a:lstStyle/>
+              <a:p>
+                <a:pPr>
+                  <a:defRPr b="false" i="false" strike="noStrike" sz="1200" u="none">
+                    <a:solidFill>
+                      <a:srgbClr val="000000">
+                        <a:alpha val="100.00%"/>
+                      </a:srgbClr>
+                    </a:solidFill>
+                    <a:latin typeface="Calibri"/>
+                  </a:defRPr>
+                </a:pPr>
+                <a:endParaRPr lang="en-US" dirty="0"/>
+              </a:p>
+            </c:txPr>
+            <c:showVal val="1"/>
+            <c:showCatName val="0"/>
+            <c:showSerName val="0"/>
+            <c:showPercent val="0"/>
+            <c:showLeaderLines val="1"/>
+          </c:dLbls>
+          <c:cat>
+            <c:strLit>
+              <c:ptCount val="7"/>
+              <c:pt idx="0">
+                <c:v>Monday</c:v>
+              </c:pt>
+              <c:pt idx="1">
+                <c:v>Tuesday</c:v>
+              </c:pt>
+              <c:pt idx="2">
+                <c:v>Wednesday</c:v>
+              </c:pt>
+              <c:pt idx="3">
+                <c:v>Thursday</c:v>
+              </c:pt>
+              <c:pt idx="4">
+                <c:v>Friday</c:v>
+              </c:pt>
+              <c:pt idx="5">
+                <c:v>Saturday</c:v>
+              </c:pt>
+              <c:pt idx="6">
+                <c:v>Sunday</c:v>
+              </c:pt>
+            </c:strLit>
+          </c:cat>
+          <c:val>
+            <c:numLit>
+              <c:ptCount val="7"/>
+              <c:pt idx="0">
+                <c:v>20</c:v>
+              </c:pt>
+              <c:pt idx="1">
+                <c:v>66</c:v>
+              </c:pt>
+              <c:pt idx="2">
+                <c:v>5</c:v>
+              </c:pt>
+              <c:pt idx="3">
+                <c:v>24</c:v>
+              </c:pt>
+              <c:pt idx="4">
+                <c:v>88</c:v>
+              </c:pt>
+              <c:pt idx="5">
+                <c:v>33</c:v>
+              </c:pt>
+              <c:pt idx="6">
+                <c:v>55</c:v>
+              </c:pt>
+            </c:numLit>
+          </c:val>
+        </c:ser>
+        <c:marker val="1"/>
+        <c:smooth val="0"/>
+        <c:axId val="52743552"/>
+        <c:axId val="52749440"/>
+      </c:lineChart>
+      <c:catAx>
+        <c:axId val="52743552"/>
+        <c:scaling>
+          <c:orientation val="minMax"/>
+        </c:scaling>
+        <c:delete val="0"/>
+        <c:axPos val="b"/>
+        <c:title>
+          <c:tx>
+            <c:rich>
+              <a:bodyPr/>
+              <a:lstStyle/>
+              <a:p>
+                <a:pPr>
+                  <a:defRPr b="false" i="false" strike="noStrike" sz="1000" u="none">
+                    <a:solidFill>
+                      <a:srgbClr val="000000">
+                        <a:alpha val="100.00%"/>
+                      </a:srgbClr>
+                    </a:solidFill>
+                    <a:latin typeface="Calibri"/>
+                  </a:defRPr>
+                </a:pPr>
+                <a:r>
+                  <a:rPr lang="en-US" dirty="0"/>
+                  <a:t>Axis Title</a:t>
+                </a:r>
+                <a:endParaRPr lang="en-US" dirty="0"/>
+              </a:p>
+            </c:rich>
+          </c:tx>
+        </c:title>
+        <c:numFmt formatCode="" sourceLinked="1"/>
+        <c:majorTickMark val="none"/>
+        <c:minorTickMark val="none"/>
+        <c:tickLblPos val="nextTo"/>
+        <c:spPr>
+          <a:ln w="0">
+            <a:noFill/>
+          </a:ln>
+        </c:spPr>
+        <c:crossAx val="52749440"/>
+        <c:crosses val="autoZero"/>
+        <c:lblAlgn val="ctr"/>
+        <c:lblOffset val="100"/>
+      </c:catAx>
+      <c:valAx>
+        <c:axId val="52749440"/>
+        <c:scaling>
+          <c:orientation val="minMax"/>
+        </c:scaling>
+        <c:delete val="0"/>
+        <c:axPos val="l"/>
+        <c:title>
+          <c:tx>
+            <c:rich>
+              <a:bodyPr/>
+              <a:lstStyle/>
+              <a:p>
+                <a:pPr>
+                  <a:defRPr b="false" i="false" strike="noStrike" sz="1000" u="none">
+                    <a:solidFill>
+                      <a:srgbClr val="000000">
+                        <a:alpha val="100.00%"/>
+                      </a:srgbClr>
+                    </a:solidFill>
+                    <a:latin typeface="Calibri"/>
+                  </a:defRPr>
+                </a:pPr>
+                <a:r>
+                  <a:rPr lang="en-US" dirty="0"/>
+                  <a:t>Axis Title</a:t>
+                </a:r>
+                <a:endParaRPr lang="en-US" dirty="0"/>
+              </a:p>
+            </c:rich>
+          </c:tx>
+        </c:title>
+        <c:numFmt formatCode="" sourceLinked="1"/>
+        <c:majorTickMark val="none"/>
+        <c:minorTickMark val="none"/>
+        <c:tickLblPos val="nextTo"/>
+        <c:spPr>
+          <a:ln w="0">
+            <a:noFill/>
+          </a:ln>
+        </c:spPr>
+        <c:crossAx val="52743552"/>
+        <c:crosses val="autoZero"/>
+        <c:crossBetween val="between"/>
+      </c:valAx>
+    </c:plotArea>
+    <c:legend>
+      <c:legendPos val="r"/>
+      <c:layout>
+        <c:manualLayout>
+          <c:xMode val="edge"/>
+          <c:yMode val="edge"/>
+        </c:manualLayout>
+      </c:layout>
+      <c:overlay val="0"/>
+      <c:spPr>
+        <a:noFill/>
+        <a:ln w="12700" cap="flat" cmpd="sng" algn="ctr">
+          <a:solidFill>
+            <a:srgbClr val="000000">
+              <a:alpha val="100.00%"/>
+            </a:srgbClr>
+          </a:solidFill>
+          <a:prstDash val="solid"/>
+          <a:round/>
+          <a:headEnd type="none" w="med" len="med"/>
+          <a:tailEnd type="none" w="med" len="med"/>
+        </a:ln>
+      </c:spPr>
+      <c:txPr>
+        <a:bodyPr/>
+        <a:lstStyle/>
+        <a:p>
+          <a:pPr algn="l" fontAlgn="base" marL="0" marR="0" indent="0" lvl="0">
+            <a:defRPr b="false" i="true" strike="noStrike" sz="1000" u="none">
+              <a:solidFill>
+                <a:srgbClr val="000000">
+                  <a:alpha val="100.00%"/>
+                </a:srgbClr>
+              </a:solidFill>
+              <a:latin typeface="Calibri"/>
+            </a:defRPr>
+          </a:pPr>
+          <a:endParaRPr lang="en-US" dirty="0"/>
+        </a:p>
+      </c:txPr>
+    </c:legend>
+    <c:plotVisOnly val="1"/>
+  </c:chart>
+  <c:spPr>
+    <a:solidFill>
+      <a:srgbClr val="ffe6e6">
+        <a:alpha val="100.00%"/>
+      </a:srgbClr>
+    </a:solidFill>
+    <a:ln w="12700" cap="flat" cmpd="sng" algn="ctr">
+      <a:solidFill>
+        <a:srgbClr val="000000">
+          <a:alpha val="100.00%"/>
+        </a:srgbClr>
+      </a:solidFill>
+      <a:prstDash val="solid"/>
+      <a:round/>
+      <a:headEnd type="none" w="med" len="med"/>
+      <a:tailEnd type="none" w="med" len="med"/>
+    </a:ln>
+    <a:effectLst>
+      <a:outerShdw blurRad="57150" dist="95250" dir="2700000" algn="br" rotWithShape="0">
+        <a:srgbClr val="000000">
+          <a:alpha val="50%"/>
+        </a:srgbClr>
+      </a:outerShdw>
+    </a:effectLst>
+  </c:spPr>
+</c:chartSpace>
 </file>
 
 <file path=ppt/slideLayouts/slideLayout1.xml><?xml version="1.0" encoding="utf-8"?>
@@ -161,7 +483,7 @@
   </p:cSld>
   <p:clrMap bg1="lt1" tx1="dk1" bg2="lt2" tx2="dk2" accent1="accent1" accent2="accent2" accent3="accent3" accent4="accent4" accent5="accent5" accent6="accent6" hlink="hlink" folHlink="folHlink"/>
   <p:sldLayoutIdLst>
-    <p:sldLayoutId id="2274781298" r:id="rId1"/>
+    <p:sldLayoutId id="2274989105" r:id="rId1"/>
   </p:sldLayoutIdLst>
   <p:txStyles>
     <p:titleStyle>
@@ -209,101 +531,53 @@
       </p:nvGrpSpPr>
       <p:grpSpPr>
         <a:xfrm>
-          <a:off x="95250" y="1714500"/>
-          <a:ext cx="9039225" cy="4762500"/>
-          <a:chOff x="95250" y="1714500"/>
-          <a:chExt cx="9039225" cy="4762500"/>
+          <a:off x="0" y="0"/>
+          <a:ext cx="0" cy="0"/>
+          <a:chOff x="0" y="0"/>
+          <a:chExt cx="0" cy="0"/>
         </a:xfrm>
       </p:grpSpPr>
-      <p:pic>
-        <p:nvPicPr>
-          <p:cNvPr id="1" name="imageLeft" descr="image of the left"/>
-          <p:cNvPicPr>
-            <a:picLocks noChangeAspect="1"/>
-          </p:cNvPicPr>
+    </p:spTree>
+  </p:cSld>
+  <p:clrMapOvr>
+    <a:masterClrMapping/>
+  </p:clrMapOvr>
+</p:sld>
+</file>
+
+<file path=ppt/slides/slide2.xml><?xml version="1.0" encoding="utf-8"?>
+<p:sld xmlns:a="http://schemas.openxmlformats.org/drawingml/2006/main" xmlns:r="http://schemas.openxmlformats.org/officeDocument/2006/relationships" xmlns:p="http://schemas.openxmlformats.org/presentationml/2006/main">
+  <p:cSld>
+    <p:spTree>
+      <p:nvGrpSpPr>
+        <p:cNvPr id="1" name=""/>
+        <p:cNvGrpSpPr/>
+        <p:nvPr/>
+      </p:nvGrpSpPr>
+      <p:grpSpPr>
+        <a:xfrm>
+          <a:off x="1143000" y="762000"/>
+          <a:ext cx="7810500" cy="6000750"/>
+          <a:chOff x="1143000" y="762000"/>
+          <a:chExt cx="7810500" cy="6000750"/>
+        </a:xfrm>
+      </p:grpSpPr>
+      <p:graphicFrame>
+        <p:nvGraphicFramePr>
+          <p:cNvPr id="1" name="PHPPRESENTATION PRUEBA DE GRAFICO" descr=""/>
+          <p:cNvGraphicFramePr/>
           <p:nvPr/>
-        </p:nvPicPr>
-        <p:blipFill>
-          <a:blip r:embed="rId2"/>
-          <a:stretch>
-            <a:fillRect/>
-          </a:stretch>
-        </p:blipFill>
-        <p:spPr>
-          <a:xfrm>
-            <a:off x="95250" y="1905000"/>
-            <a:ext cx="4295775" cy="2857500"/>
-          </a:xfrm>
-          <a:prstGeom prst="rect">
-            <a:avLst/>
-          </a:prstGeom>
-        </p:spPr>
-      </p:pic>
-      <p:pic>
-        <p:nvPicPr>
-          <p:cNvPr id="2" name="imageRight" descr="image of the right"/>
-          <p:cNvPicPr>
-            <a:picLocks noChangeAspect="1"/>
-          </p:cNvPicPr>
-          <p:nvPr/>
-        </p:nvPicPr>
-        <p:blipFill>
-          <a:blip r:embed="rId3"/>
-          <a:stretch>
-            <a:fillRect/>
-          </a:stretch>
-        </p:blipFill>
-        <p:spPr>
-          <a:xfrm>
-            <a:off x="4762500" y="1905000"/>
-            <a:ext cx="4276725" cy="2857500"/>
-          </a:xfrm>
-          <a:prstGeom prst="rect">
-            <a:avLst/>
-          </a:prstGeom>
-        </p:spPr>
-      </p:pic>
-      <p:sp>
-        <p:nvSpPr>
-          <p:cNvPr id="3" name=""/>
-          <p:cNvSpPr txBox="1"/>
-          <p:nvPr/>
-        </p:nvSpPr>
-        <p:spPr>
-          <a:xfrm>
-            <a:off x="1619250" y="1714500"/>
-            <a:ext cx="5715000" cy="2857500"/>
-          </a:xfrm>
-          <a:prstGeom prst="rect">
-            <a:avLst/>
-          </a:prstGeom>
-          <a:noFill/>
-        </p:spPr>
-        <p:txBody>
-          <a:bodyPr rtlCol="0" bIns="45720" lIns="91440" rIns="91440" tIns="45720">
-            <a:spAutoFit/>
-          </a:bodyPr>
-          <a:lstStyle/>
-          <a:p>
-            <a:pPr algn="ctr" fontAlgn="base" marL="0" marR="0" indent="0" lvl="0">
-              <a:lnSpc>
-                <a:spcPct val="100%"/>
-              </a:lnSpc>
-            </a:pPr>
-            <a:r>
-              <a:rPr lang="en-US" b="1" sz="1600" spc="0" u="none">
-                <a:solidFill>
-                  <a:srgbClr val="E06B20">
-                    <a:alpha val="100.00%"/>
-                  </a:srgbClr>
-                </a:solidFill>
-                <a:latin typeface="Calibri"/>
-              </a:rPr>
-              <a:t><![CDATA[Lorem Ipsum is simply dummy text of the printing and typesetting industry. Lorem Ipsum has been the industrys standard dummy text ever since the 1500s, when an unknown printer took a galley of type and scrambled it to make a type specimen book. ]]></a:t>
-            </a:r>
-          </a:p>
-        </p:txBody>
-      </p:sp>
+        </p:nvGraphicFramePr>
+        <p:xfrm>
+          <a:off x="1143000" y="762000"/>
+          <a:ext cx="6667500" cy="5238750"/>
+        </p:xfrm>
+        <a:graphic>
+          <a:graphicData uri="http://schemas.openxmlformats.org/drawingml/2006/chart">
+            <c:chart xmlns:c="http://schemas.openxmlformats.org/drawingml/2006/chart" xmlns:r="http://schemas.openxmlformats.org/officeDocument/2006/relationships" r:id="rId2"/>
+          </a:graphicData>
+        </a:graphic>
+      </p:graphicFrame>
     </p:spTree>
   </p:cSld>
   <p:clrMapOvr>
@@ -313,9 +587,9 @@
 </file>
 
 <file path=ppt/theme/theme1.xml><?xml version="1.0" encoding="utf-8"?>
-<a:theme xmlns:a="http://schemas.openxmlformats.org/drawingml/2006/main" name="Theme35">
+<a:theme xmlns:a="http://schemas.openxmlformats.org/drawingml/2006/main" name="Theme83">
   <a:themeElements>
-    <a:clrScheme name="Theme35">
+    <a:clrScheme name="Theme83">
       <a:dk1>
         <a:sysClr val="windowText" lastClr="000000"/>
       </a:dk1>
@@ -353,7 +627,7 @@
         <a:srgbClr val="800080"/>
       </a:folHlink>
     </a:clrScheme>
-    <a:fontScheme name="Theme35">
+    <a:fontScheme name="Theme83">
       <a:majorFont>
         <a:latin typeface="Calibri"/>
         <a:ea typeface=""/>
@@ -423,29 +697,29 @@
         <a:font script="Uigh" typeface="Microsoft Uighur"/>
       </a:minorFont>
     </a:fontScheme>
-    <a:fmtScheme name="Theme35">
+    <a:fmtScheme name="Theme83">
       <a:fillStyleLst>
         <a:solidFill>
           <a:schemeClr val="phClr"/>
         </a:solidFill>
         <a:gradFill rotWithShape="1">
           <a:gsLst>
-            <a:gs pos="0%">
-              <a:schemeClr val="phClr">
-                <a:tint val="50%"/>
-                <a:satMod val="300%"/>
-              </a:schemeClr>
-            </a:gs>
-            <a:gs pos="35%">
-              <a:schemeClr val="phClr">
-                <a:tint val="37%"/>
-                <a:satMod val="300%"/>
-              </a:schemeClr>
-            </a:gs>
-            <a:gs pos="100%">
-              <a:schemeClr val="phClr">
-                <a:tint val="15%"/>
-                <a:satMod val="350%"/>
+            <a:gs pos="0">
+              <a:schemeClr val="phClr">
+                <a:tint val="50"/>
+                <a:satMod val="300"/>
+              </a:schemeClr>
+            </a:gs>
+            <a:gs pos="35">
+              <a:schemeClr val="phClr">
+                <a:tint val="37"/>
+                <a:satMod val="300"/>
+              </a:schemeClr>
+            </a:gs>
+            <a:gs pos="100">
+              <a:schemeClr val="phClr">
+                <a:tint val="15"/>
+                <a:satMod val="350"/>
               </a:schemeClr>
             </a:gs>
           </a:gsLst>
@@ -453,22 +727,22 @@
         </a:gradFill>
         <a:gradFill rotWithShape="1">
           <a:gsLst>
-            <a:gs pos="0%">
-              <a:schemeClr val="phClr">
-                <a:shade val="51%"/>
-                <a:satMod val="130%"/>
-              </a:schemeClr>
-            </a:gs>
-            <a:gs pos="80%">
-              <a:schemeClr val="phClr">
-                <a:shade val="93%"/>
-                <a:satMod val="130%"/>
-              </a:schemeClr>
-            </a:gs>
-            <a:gs pos="100%">
-              <a:schemeClr val="phClr">
-                <a:shade val="94%"/>
-                <a:satMod val="135%"/>
+            <a:gs pos="0">
+              <a:schemeClr val="phClr">
+                <a:shade val="51"/>
+                <a:satMod val="130"/>
+              </a:schemeClr>
+            </a:gs>
+            <a:gs pos="80">
+              <a:schemeClr val="phClr">
+                <a:shade val="93"/>
+                <a:satMod val="130"/>
+              </a:schemeClr>
+            </a:gs>
+            <a:gs pos="100">
+              <a:schemeClr val="phClr">
+                <a:shade val="94"/>
+                <a:satMod val="135"/>
               </a:schemeClr>
             </a:gs>
           </a:gsLst>
@@ -479,8 +753,8 @@
         <a:ln w="9525" cap="flat" cmpd="sng" algn="ctr">
           <a:solidFill>
             <a:schemeClr val="phClr">
-              <a:shade val="95%"/>
-              <a:satMod val="105%"/>
+              <a:shade val="95"/>
+              <a:satMod val="105"/>
             </a:schemeClr>
           </a:solidFill>
           <a:prstDash val="solid"/>
@@ -503,7 +777,7 @@
           <a:effectLst>
             <a:outerShdw blurRad="40000" dir="5400000" dist="20000" rotWithShape="0">
               <a:srgbClr val="000000">
-                <a:alpha val="38%"/>
+                <a:alpha val="38"/>
               </a:srgbClr>
             </a:outerShdw>
           </a:effectLst>
@@ -512,7 +786,7 @@
           <a:effectLst>
             <a:outerShdw blurRad="40000" dir="5400000" dist="23000" rotWithShape="0">
               <a:srgbClr val="000000">
-                <a:alpha val="35%"/>
+                <a:alpha val="35"/>
               </a:srgbClr>
             </a:outerShdw>
           </a:effectLst>
@@ -521,7 +795,7 @@
           <a:effectLst>
             <a:outerShdw blurRad="40000" dir="5400000" dist="23000" rotWithShape="0">
               <a:srgbClr val="000000">
-                <a:alpha val="35%"/>
+                <a:alpha val="35"/>
               </a:srgbClr>
             </a:outerShdw>
           </a:effectLst>
@@ -544,47 +818,47 @@
         </a:solidFill>
         <a:gradFill rotWithShape="1">
           <a:gsLst>
-            <a:gs pos="0%">
-              <a:schemeClr val="phClr">
-                <a:tint val="40%"/>
-                <a:satMod val="350%"/>
-              </a:schemeClr>
-            </a:gs>
-            <a:gs pos="40%">
-              <a:schemeClr val="phClr">
-                <a:tint val="45%"/>
-                <a:shade val="99%"/>
-                <a:satMod val="350%"/>
-              </a:schemeClr>
-            </a:gs>
-            <a:gs pos="100%">
-              <a:schemeClr val="phClr">
-                <a:shade val="20%"/>
-                <a:satMod val="255%"/>
+            <a:gs pos="0">
+              <a:schemeClr val="phClr">
+                <a:tint val="40"/>
+                <a:satMod val="350"/>
+              </a:schemeClr>
+            </a:gs>
+            <a:gs pos="40">
+              <a:schemeClr val="phClr">
+                <a:tint val="45"/>
+                <a:shade val="99"/>
+                <a:satMod val="350"/>
+              </a:schemeClr>
+            </a:gs>
+            <a:gs pos="100">
+              <a:schemeClr val="phClr">
+                <a:shade val="20"/>
+                <a:satMod val="255"/>
               </a:schemeClr>
             </a:gs>
           </a:gsLst>
           <a:path path="circle">
-            <a:fillToRect b="180%" l="50%" r="50%" t="-80%"/>
+            <a:fillToRect b="180" l="50" r="50" t="-80"/>
           </a:path>
         </a:gradFill>
         <a:gradFill rotWithShape="1">
           <a:gsLst>
-            <a:gs pos="0%">
-              <a:schemeClr val="phClr">
-                <a:tint val="80%"/>
-                <a:satMod val="300%"/>
-              </a:schemeClr>
-            </a:gs>
-            <a:gs pos="100%">
-              <a:schemeClr val="phClr">
-                <a:shade val="30%"/>
-                <a:satMod val="200%"/>
+            <a:gs pos="0">
+              <a:schemeClr val="phClr">
+                <a:tint val="80"/>
+                <a:satMod val="300"/>
+              </a:schemeClr>
+            </a:gs>
+            <a:gs pos="100">
+              <a:schemeClr val="phClr">
+                <a:shade val="30"/>
+                <a:satMod val="200"/>
               </a:schemeClr>
             </a:gs>
           </a:gsLst>
           <a:path path="circle">
-            <a:fillToRect b="50%" l="50%" r="50%" t="50%"/>
+            <a:fillToRect b="50" l="50" r="50" t="50"/>
           </a:path>
         </a:gradFill>
       </a:bgFillStyleLst>

</xml_diff>

<commit_message>
Creacion de segundo grafico de diferente tipo, separacion de funcionalidades en metodos
</commit_message>
<xml_diff>
--- a/app/Http/Controllers/sample.pptx
+++ b/app/Http/Controllers/sample.pptx
@@ -8,7 +8,7 @@
     <p:sldId id="256" r:id="rId3"/>
     <p:sldId id="257" r:id="rId4"/>
   </p:sldIdLst>
-  <p:sldSz cx="9144000" cy="6858000" type="screen4x3"/>
+  <p:sldSz cx="9144000" cy="5143500" type="screen16x9"/>
   <p:notesSz cx="6858000" cy="9144000"/>
   <p:defaultTextStyle>
     <a:defPPr>
@@ -131,7 +131,7 @@
                 </a:solidFill>
                 <a:latin typeface="Calibri"/>
               </a:rPr>
-              <a:t>PHPPRESENTATION PRUEBA DE GRAFICO</a:t>
+              <a:t>PHPPRESENTATION DE LA IZQUIERDA</a:t>
             </a:r>
             <a:endParaRPr lang="en-US" dirty="0"/>
           </a:p>
@@ -241,22 +241,22 @@
                 <c:v>20</c:v>
               </c:pt>
               <c:pt idx="1">
+                <c:v>2</c:v>
+              </c:pt>
+              <c:pt idx="2">
+                <c:v>100</c:v>
+              </c:pt>
+              <c:pt idx="3">
+                <c:v>50</c:v>
+              </c:pt>
+              <c:pt idx="4">
                 <c:v>66</c:v>
               </c:pt>
-              <c:pt idx="2">
-                <c:v>5</c:v>
-              </c:pt>
-              <c:pt idx="3">
-                <c:v>24</c:v>
-              </c:pt>
-              <c:pt idx="4">
+              <c:pt idx="5">
                 <c:v>88</c:v>
               </c:pt>
-              <c:pt idx="5">
+              <c:pt idx="6">
                 <c:v>33</c:v>
-              </c:pt>
-              <c:pt idx="6">
-                <c:v>55</c:v>
               </c:pt>
             </c:numLit>
           </c:val>
@@ -429,6 +429,311 @@
 </c:chartSpace>
 </file>
 
+<file path=ppt/charts/chart2.xml><?xml version="1.0" encoding="utf-8"?>
+<c:chartSpace xmlns:c="http://schemas.openxmlformats.org/drawingml/2006/chart" xmlns:a="http://schemas.openxmlformats.org/drawingml/2006/main" xmlns:r="http://schemas.openxmlformats.org/officeDocument/2006/relationships">
+  <c:date1904 val="1"/>
+  <c:lang val="en-US"/>
+  <c:chart>
+    <c:title>
+      <c:tx>
+        <c:rich>
+          <a:bodyPr/>
+          <a:lstStyle/>
+          <a:p>
+            <a:pPr algn="l" fontAlgn="base" marL="0" marR="0" indent="0" lvl="0">
+              <a:defRPr/>
+            </a:pPr>
+            <a:r>
+              <a:rPr lang="en-US" dirty="0" b="false" i="true" strike="noStrike" sz="1800" u="none">
+                <a:solidFill>
+                  <a:srgbClr val="000000">
+                    <a:alpha val="100.00%"/>
+                  </a:srgbClr>
+                </a:solidFill>
+                <a:latin typeface="Calibri"/>
+              </a:rPr>
+              <a:t>PHPPRESENTATION DE LA DERECHA</a:t>
+            </a:r>
+            <a:endParaRPr lang="en-US" dirty="0"/>
+          </a:p>
+        </c:rich>
+      </c:tx>
+      <c:layout>
+        <c:manualLayout>
+          <c:xMode val="edge"/>
+          <c:yMode val="edge"/>
+          <c:x val="0.01"/>
+          <c:y val="0.01"/>
+        </c:manualLayout>
+      </c:layout>
+      <c:overlay val="0"/>
+    </c:title>
+    <c:autoTitleDeleted val="0"/>
+    <c:view3D>
+      <c:rotX val="30"/>
+      <c:hPercent val="100"/>
+      <c:rotY val="0"/>
+      <c:depthPercent val="100"/>
+      <c:rAngAx val="1"/>
+      <c:perspective val="30"/>
+    </c:view3D>
+    <c:plotArea>
+      <c:layout>
+        <c:manualLayout>
+          <c:xMode val="edge"/>
+          <c:yMode val="edge"/>
+        </c:manualLayout>
+      </c:layout>
+      <c:scatterChart>
+        <c:scatterStyle val="lineMarker"/>
+        <c:varyColors val="0"/>
+        <c:ser>
+          <c:idx val="0"/>
+          <c:order val="0"/>
+          <c:tx>
+            <c:v>Valores</c:v>
+          </c:tx>
+          <c:marker>
+            <c:symbol val="circle"/>
+            <c:size val="10"/>
+          </c:marker>
+          <c:dLbls>
+            <c:txPr>
+              <a:bodyPr/>
+              <a:lstStyle/>
+              <a:p>
+                <a:pPr>
+                  <a:defRPr b="false" i="false" strike="noStrike" sz="900" u="none">
+                    <a:solidFill>
+                      <a:srgbClr val="000000">
+                        <a:alpha val="100.00%"/>
+                      </a:srgbClr>
+                    </a:solidFill>
+                    <a:latin typeface="Calibri"/>
+                  </a:defRPr>
+                </a:pPr>
+                <a:endParaRPr lang="en-US" dirty="0"/>
+              </a:p>
+            </c:txPr>
+            <c:showLegendKey val="0"/>
+            <c:showVal val="1"/>
+            <c:showCatName val="0"/>
+            <c:showSerName val="1"/>
+            <c:showPercent val="0"/>
+            <c:showLeaderLines val="1"/>
+          </c:dLbls>
+          <c:spPr>
+            <a:noFill/>
+          </c:spPr>
+          <c:xVal>
+            <c:strLit>
+              <c:ptCount val="7"/>
+              <c:pt idx="0">
+                <c:v>Monday</c:v>
+              </c:pt>
+              <c:pt idx="1">
+                <c:v>Tuesday</c:v>
+              </c:pt>
+              <c:pt idx="2">
+                <c:v>Wednesday</c:v>
+              </c:pt>
+              <c:pt idx="3">
+                <c:v>Thursday</c:v>
+              </c:pt>
+              <c:pt idx="4">
+                <c:v>Friday</c:v>
+              </c:pt>
+              <c:pt idx="5">
+                <c:v>Saturday</c:v>
+              </c:pt>
+              <c:pt idx="6">
+                <c:v>Sunday</c:v>
+              </c:pt>
+            </c:strLit>
+          </c:xVal>
+          <c:yVal>
+            <c:numLit>
+              <c:ptCount val="7"/>
+              <c:pt idx="0">
+                <c:v>20</c:v>
+              </c:pt>
+              <c:pt idx="1">
+                <c:v>2</c:v>
+              </c:pt>
+              <c:pt idx="2">
+                <c:v>100</c:v>
+              </c:pt>
+              <c:pt idx="3">
+                <c:v>50</c:v>
+              </c:pt>
+              <c:pt idx="4">
+                <c:v>66</c:v>
+              </c:pt>
+              <c:pt idx="5">
+                <c:v>88</c:v>
+              </c:pt>
+              <c:pt idx="6">
+                <c:v>33</c:v>
+              </c:pt>
+            </c:numLit>
+          </c:yVal>
+          <c:smooth val="0"/>
+        </c:ser>
+        <c:axId val="52743552"/>
+        <c:axId val="52749440"/>
+      </c:scatterChart>
+      <c:catAx>
+        <c:axId val="52743552"/>
+        <c:scaling>
+          <c:orientation val="minMax"/>
+        </c:scaling>
+        <c:delete val="0"/>
+        <c:axPos val="b"/>
+        <c:title>
+          <c:tx>
+            <c:rich>
+              <a:bodyPr/>
+              <a:lstStyle/>
+              <a:p>
+                <a:pPr>
+                  <a:defRPr b="false" i="false" strike="noStrike" sz="1000" u="none">
+                    <a:solidFill>
+                      <a:srgbClr val="000000">
+                        <a:alpha val="100.00%"/>
+                      </a:srgbClr>
+                    </a:solidFill>
+                    <a:latin typeface="Calibri"/>
+                  </a:defRPr>
+                </a:pPr>
+                <a:r>
+                  <a:rPr lang="en-US" dirty="0"/>
+                  <a:t>Axis Title</a:t>
+                </a:r>
+                <a:endParaRPr lang="en-US" dirty="0"/>
+              </a:p>
+            </c:rich>
+          </c:tx>
+        </c:title>
+        <c:numFmt formatCode="" sourceLinked="1"/>
+        <c:majorTickMark val="none"/>
+        <c:minorTickMark val="none"/>
+        <c:tickLblPos val="nextTo"/>
+        <c:spPr>
+          <a:ln w="0">
+            <a:noFill/>
+          </a:ln>
+        </c:spPr>
+        <c:crossAx val="52749440"/>
+        <c:crosses val="autoZero"/>
+        <c:lblAlgn val="ctr"/>
+        <c:lblOffset val="100"/>
+      </c:catAx>
+      <c:valAx>
+        <c:axId val="52749440"/>
+        <c:scaling>
+          <c:orientation val="minMax"/>
+        </c:scaling>
+        <c:delete val="0"/>
+        <c:axPos val="l"/>
+        <c:title>
+          <c:tx>
+            <c:rich>
+              <a:bodyPr/>
+              <a:lstStyle/>
+              <a:p>
+                <a:pPr>
+                  <a:defRPr b="false" i="false" strike="noStrike" sz="1000" u="none">
+                    <a:solidFill>
+                      <a:srgbClr val="000000">
+                        <a:alpha val="100.00%"/>
+                      </a:srgbClr>
+                    </a:solidFill>
+                    <a:latin typeface="Calibri"/>
+                  </a:defRPr>
+                </a:pPr>
+                <a:r>
+                  <a:rPr lang="en-US" dirty="0"/>
+                  <a:t>Axis Title</a:t>
+                </a:r>
+                <a:endParaRPr lang="en-US" dirty="0"/>
+              </a:p>
+            </c:rich>
+          </c:tx>
+        </c:title>
+        <c:numFmt formatCode="" sourceLinked="1"/>
+        <c:majorTickMark val="none"/>
+        <c:minorTickMark val="none"/>
+        <c:tickLblPos val="nextTo"/>
+        <c:spPr>
+          <a:ln w="0">
+            <a:noFill/>
+          </a:ln>
+        </c:spPr>
+        <c:crossAx val="52743552"/>
+        <c:crosses val="autoZero"/>
+        <c:crossBetween val="between"/>
+      </c:valAx>
+    </c:plotArea>
+    <c:legend>
+      <c:legendPos val="r"/>
+      <c:layout>
+        <c:manualLayout>
+          <c:xMode val="edge"/>
+          <c:yMode val="edge"/>
+        </c:manualLayout>
+      </c:layout>
+      <c:overlay val="0"/>
+      <c:spPr>
+        <a:noFill/>
+        <a:ln w="12700" cap="flat" cmpd="sng" algn="ctr">
+          <a:solidFill>
+            <a:srgbClr val="000000">
+              <a:alpha val="100.00%"/>
+            </a:srgbClr>
+          </a:solidFill>
+          <a:prstDash val="solid"/>
+          <a:round/>
+          <a:headEnd type="none" w="med" len="med"/>
+          <a:tailEnd type="none" w="med" len="med"/>
+        </a:ln>
+      </c:spPr>
+      <c:txPr>
+        <a:bodyPr/>
+        <a:lstStyle/>
+        <a:p>
+          <a:pPr algn="l" fontAlgn="base" marL="0" marR="0" indent="0" lvl="0">
+            <a:defRPr b="false" i="true" strike="noStrike" sz="1000" u="none">
+              <a:solidFill>
+                <a:srgbClr val="000000">
+                  <a:alpha val="100.00%"/>
+                </a:srgbClr>
+              </a:solidFill>
+              <a:latin typeface="Calibri"/>
+            </a:defRPr>
+          </a:pPr>
+          <a:endParaRPr lang="en-US" dirty="0"/>
+        </a:p>
+      </c:txPr>
+    </c:legend>
+    <c:plotVisOnly val="1"/>
+  </c:chart>
+  <c:spPr>
+    <a:solidFill>
+      <a:srgbClr val="ffe6e6">
+        <a:alpha val="100.00%"/>
+      </a:srgbClr>
+    </a:solidFill>
+    <a:effectLst>
+      <a:outerShdw blurRad="57150" dist="95250" dir="2700000" algn="br" rotWithShape="0">
+        <a:srgbClr val="000000">
+          <a:alpha val="50%"/>
+        </a:srgbClr>
+      </a:outerShdw>
+    </a:effectLst>
+  </c:spPr>
+</c:chartSpace>
+</file>
+
 <file path=ppt/slideLayouts/slideLayout1.xml><?xml version="1.0" encoding="utf-8"?>
 <p:sldLayout xmlns:a="http://schemas.openxmlformats.org/drawingml/2006/main" xmlns:r="http://schemas.openxmlformats.org/officeDocument/2006/relationships" xmlns:p="http://schemas.openxmlformats.org/presentationml/2006/main" preserve="1">
   <p:cSld>
@@ -483,7 +788,7 @@
   </p:cSld>
   <p:clrMap bg1="lt1" tx1="dk1" bg2="lt2" tx2="dk2" accent1="accent1" accent2="accent2" accent3="accent3" accent4="accent4" accent5="accent5" accent6="accent6" hlink="hlink" folHlink="folHlink"/>
   <p:sldLayoutIdLst>
-    <p:sldLayoutId id="2274989105" r:id="rId1"/>
+    <p:sldLayoutId id="2275050540" r:id="rId1"/>
   </p:sldLayoutIdLst>
   <p:txStyles>
     <p:titleStyle>
@@ -556,25 +861,41 @@
       </p:nvGrpSpPr>
       <p:grpSpPr>
         <a:xfrm>
-          <a:off x="1143000" y="762000"/>
-          <a:ext cx="7810500" cy="6000750"/>
-          <a:chOff x="1143000" y="762000"/>
-          <a:chExt cx="7810500" cy="6000750"/>
+          <a:off x="95250" y="1143000"/>
+          <a:ext cx="9048750" cy="4953000"/>
+          <a:chOff x="95250" y="1143000"/>
+          <a:chExt cx="9048750" cy="4953000"/>
         </a:xfrm>
       </p:grpSpPr>
       <p:graphicFrame>
         <p:nvGraphicFramePr>
-          <p:cNvPr id="1" name="PHPPRESENTATION PRUEBA DE GRAFICO" descr=""/>
+          <p:cNvPr id="1" name="PHPPRESENTATION DE LA IZQUIERDA" descr=""/>
           <p:cNvGraphicFramePr/>
           <p:nvPr/>
         </p:nvGraphicFramePr>
         <p:xfrm>
-          <a:off x="1143000" y="762000"/>
-          <a:ext cx="6667500" cy="5238750"/>
+          <a:off x="95250" y="1143000"/>
+          <a:ext cx="4286250" cy="3810000"/>
         </p:xfrm>
         <a:graphic>
           <a:graphicData uri="http://schemas.openxmlformats.org/drawingml/2006/chart">
             <c:chart xmlns:c="http://schemas.openxmlformats.org/drawingml/2006/chart" xmlns:r="http://schemas.openxmlformats.org/officeDocument/2006/relationships" r:id="rId2"/>
+          </a:graphicData>
+        </a:graphic>
+      </p:graphicFrame>
+      <p:graphicFrame>
+        <p:nvGraphicFramePr>
+          <p:cNvPr id="2" name="PHPPRESENTATION DE LA DERECHA" descr=""/>
+          <p:cNvGraphicFramePr/>
+          <p:nvPr/>
+        </p:nvGraphicFramePr>
+        <p:xfrm>
+          <a:off x="4762500" y="1143000"/>
+          <a:ext cx="4286250" cy="3810000"/>
+        </p:xfrm>
+        <a:graphic>
+          <a:graphicData uri="http://schemas.openxmlformats.org/drawingml/2006/chart">
+            <c:chart xmlns:c="http://schemas.openxmlformats.org/drawingml/2006/chart" xmlns:r="http://schemas.openxmlformats.org/officeDocument/2006/relationships" r:id="rId3"/>
           </a:graphicData>
         </a:graphic>
       </p:graphicFrame>
@@ -587,9 +908,9 @@
 </file>
 
 <file path=ppt/theme/theme1.xml><?xml version="1.0" encoding="utf-8"?>
-<a:theme xmlns:a="http://schemas.openxmlformats.org/drawingml/2006/main" name="Theme83">
+<a:theme xmlns:a="http://schemas.openxmlformats.org/drawingml/2006/main" name="Theme40">
   <a:themeElements>
-    <a:clrScheme name="Theme83">
+    <a:clrScheme name="Theme40">
       <a:dk1>
         <a:sysClr val="windowText" lastClr="000000"/>
       </a:dk1>
@@ -627,7 +948,7 @@
         <a:srgbClr val="800080"/>
       </a:folHlink>
     </a:clrScheme>
-    <a:fontScheme name="Theme83">
+    <a:fontScheme name="Theme40">
       <a:majorFont>
         <a:latin typeface="Calibri"/>
         <a:ea typeface=""/>
@@ -697,7 +1018,7 @@
         <a:font script="Uigh" typeface="Microsoft Uighur"/>
       </a:minorFont>
     </a:fontScheme>
-    <a:fmtScheme name="Theme83">
+    <a:fmtScheme name="Theme40">
       <a:fillStyleLst>
         <a:solidFill>
           <a:schemeClr val="phClr"/>

</xml_diff>